<commit_message>
updated chapter 1 slides
</commit_message>
<xml_diff>
--- a/1 Getting Started/Chapter 1.pptx
+++ b/1 Getting Started/Chapter 1.pptx
@@ -14,6 +14,9 @@
     <p:sldId id="262" r:id="rId8"/>
     <p:sldId id="263" r:id="rId9"/>
     <p:sldId id="264" r:id="rId10"/>
+    <p:sldId id="266" r:id="rId11"/>
+    <p:sldId id="267" r:id="rId12"/>
+    <p:sldId id="265" r:id="rId13"/>
   </p:sldIdLst>
   <p:sldSz cx="12192000" cy="6858000"/>
   <p:notesSz cx="6858000" cy="9144000"/>
@@ -112,6 +115,11 @@
       </a:defRPr>
     </a:lvl9pPr>
   </p:defaultTextStyle>
+  <p:extLst>
+    <p:ext uri="{EFAFB233-063F-42B5-8137-9DF3F51BA10A}">
+      <p15:sldGuideLst xmlns:p15="http://schemas.microsoft.com/office/powerpoint/2012/main"/>
+    </p:ext>
+  </p:extLst>
 </p:presentation>
 </file>
 
@@ -262,7 +270,7 @@
           <a:p>
             <a:fld id="{37FD1A24-3936-49EC-84C4-77FDAD77FD5C}" type="datetimeFigureOut">
               <a:rPr lang="en-US" smtClean="0"/>
-              <a:t>10/12/2023</a:t>
+              <a:t>10/16/2023</a:t>
             </a:fld>
             <a:endParaRPr lang="en-US"/>
           </a:p>
@@ -460,7 +468,7 @@
           <a:p>
             <a:fld id="{37FD1A24-3936-49EC-84C4-77FDAD77FD5C}" type="datetimeFigureOut">
               <a:rPr lang="en-US" smtClean="0"/>
-              <a:t>10/12/2023</a:t>
+              <a:t>10/16/2023</a:t>
             </a:fld>
             <a:endParaRPr lang="en-US"/>
           </a:p>
@@ -668,7 +676,7 @@
           <a:p>
             <a:fld id="{37FD1A24-3936-49EC-84C4-77FDAD77FD5C}" type="datetimeFigureOut">
               <a:rPr lang="en-US" smtClean="0"/>
-              <a:t>10/12/2023</a:t>
+              <a:t>10/16/2023</a:t>
             </a:fld>
             <a:endParaRPr lang="en-US"/>
           </a:p>
@@ -866,7 +874,7 @@
           <a:p>
             <a:fld id="{37FD1A24-3936-49EC-84C4-77FDAD77FD5C}" type="datetimeFigureOut">
               <a:rPr lang="en-US" smtClean="0"/>
-              <a:t>10/12/2023</a:t>
+              <a:t>10/16/2023</a:t>
             </a:fld>
             <a:endParaRPr lang="en-US"/>
           </a:p>
@@ -1141,7 +1149,7 @@
           <a:p>
             <a:fld id="{37FD1A24-3936-49EC-84C4-77FDAD77FD5C}" type="datetimeFigureOut">
               <a:rPr lang="en-US" smtClean="0"/>
-              <a:t>10/12/2023</a:t>
+              <a:t>10/16/2023</a:t>
             </a:fld>
             <a:endParaRPr lang="en-US"/>
           </a:p>
@@ -1406,7 +1414,7 @@
           <a:p>
             <a:fld id="{37FD1A24-3936-49EC-84C4-77FDAD77FD5C}" type="datetimeFigureOut">
               <a:rPr lang="en-US" smtClean="0"/>
-              <a:t>10/12/2023</a:t>
+              <a:t>10/16/2023</a:t>
             </a:fld>
             <a:endParaRPr lang="en-US"/>
           </a:p>
@@ -1818,7 +1826,7 @@
           <a:p>
             <a:fld id="{37FD1A24-3936-49EC-84C4-77FDAD77FD5C}" type="datetimeFigureOut">
               <a:rPr lang="en-US" smtClean="0"/>
-              <a:t>10/12/2023</a:t>
+              <a:t>10/16/2023</a:t>
             </a:fld>
             <a:endParaRPr lang="en-US"/>
           </a:p>
@@ -1959,7 +1967,7 @@
           <a:p>
             <a:fld id="{37FD1A24-3936-49EC-84C4-77FDAD77FD5C}" type="datetimeFigureOut">
               <a:rPr lang="en-US" smtClean="0"/>
-              <a:t>10/12/2023</a:t>
+              <a:t>10/16/2023</a:t>
             </a:fld>
             <a:endParaRPr lang="en-US"/>
           </a:p>
@@ -2072,7 +2080,7 @@
           <a:p>
             <a:fld id="{37FD1A24-3936-49EC-84C4-77FDAD77FD5C}" type="datetimeFigureOut">
               <a:rPr lang="en-US" smtClean="0"/>
-              <a:t>10/12/2023</a:t>
+              <a:t>10/16/2023</a:t>
             </a:fld>
             <a:endParaRPr lang="en-US"/>
           </a:p>
@@ -2383,7 +2391,7 @@
           <a:p>
             <a:fld id="{37FD1A24-3936-49EC-84C4-77FDAD77FD5C}" type="datetimeFigureOut">
               <a:rPr lang="en-US" smtClean="0"/>
-              <a:t>10/12/2023</a:t>
+              <a:t>10/16/2023</a:t>
             </a:fld>
             <a:endParaRPr lang="en-US"/>
           </a:p>
@@ -2671,7 +2679,7 @@
           <a:p>
             <a:fld id="{37FD1A24-3936-49EC-84C4-77FDAD77FD5C}" type="datetimeFigureOut">
               <a:rPr lang="en-US" smtClean="0"/>
-              <a:t>10/12/2023</a:t>
+              <a:t>10/16/2023</a:t>
             </a:fld>
             <a:endParaRPr lang="en-US"/>
           </a:p>
@@ -2912,7 +2920,7 @@
           <a:p>
             <a:fld id="{37FD1A24-3936-49EC-84C4-77FDAD77FD5C}" type="datetimeFigureOut">
               <a:rPr lang="en-US" smtClean="0"/>
-              <a:t>10/12/2023</a:t>
+              <a:t>10/16/2023</a:t>
             </a:fld>
             <a:endParaRPr lang="en-US"/>
           </a:p>
@@ -3398,6 +3406,349 @@
 </p:sld>
 </file>
 
+<file path=ppt/slides/slide10.xml><?xml version="1.0" encoding="utf-8"?>
+<p:sld xmlns:a="http://schemas.openxmlformats.org/drawingml/2006/main" xmlns:r="http://schemas.openxmlformats.org/officeDocument/2006/relationships" xmlns:p="http://schemas.openxmlformats.org/presentationml/2006/main">
+  <p:cSld>
+    <p:spTree>
+      <p:nvGrpSpPr>
+        <p:cNvPr id="1" name=""/>
+        <p:cNvGrpSpPr/>
+        <p:nvPr/>
+      </p:nvGrpSpPr>
+      <p:grpSpPr>
+        <a:xfrm>
+          <a:off x="0" y="0"/>
+          <a:ext cx="0" cy="0"/>
+          <a:chOff x="0" y="0"/>
+          <a:chExt cx="0" cy="0"/>
+        </a:xfrm>
+      </p:grpSpPr>
+      <p:sp>
+        <p:nvSpPr>
+          <p:cNvPr id="2" name="Title 1">
+            <a:extLst>
+              <a:ext uri="{FF2B5EF4-FFF2-40B4-BE49-F238E27FC236}">
+                <a16:creationId xmlns:a16="http://schemas.microsoft.com/office/drawing/2014/main" id="{7256B29E-BE09-3CBA-5A39-8EB0FC6CE8F8}"/>
+              </a:ext>
+            </a:extLst>
+          </p:cNvPr>
+          <p:cNvSpPr>
+            <a:spLocks noGrp="1"/>
+          </p:cNvSpPr>
+          <p:nvPr>
+            <p:ph type="title"/>
+          </p:nvPr>
+        </p:nvSpPr>
+        <p:spPr/>
+        <p:txBody>
+          <a:bodyPr/>
+          <a:lstStyle/>
+          <a:p>
+            <a:r>
+              <a:rPr lang="en-US" dirty="0"/>
+              <a:t>Opening The Workshop in </a:t>
+            </a:r>
+            <a:r>
+              <a:rPr lang="en-US" dirty="0" err="1"/>
+              <a:t>VSCode</a:t>
+            </a:r>
+            <a:endParaRPr lang="en-US" dirty="0"/>
+          </a:p>
+        </p:txBody>
+      </p:sp>
+      <p:sp>
+        <p:nvSpPr>
+          <p:cNvPr id="3" name="Content Placeholder 2">
+            <a:extLst>
+              <a:ext uri="{FF2B5EF4-FFF2-40B4-BE49-F238E27FC236}">
+                <a16:creationId xmlns:a16="http://schemas.microsoft.com/office/drawing/2014/main" id="{64B3C406-E49D-7FD9-ED16-CF3CB936939B}"/>
+              </a:ext>
+            </a:extLst>
+          </p:cNvPr>
+          <p:cNvSpPr>
+            <a:spLocks noGrp="1"/>
+          </p:cNvSpPr>
+          <p:nvPr>
+            <p:ph idx="1"/>
+          </p:nvPr>
+        </p:nvSpPr>
+        <p:spPr>
+          <a:xfrm>
+            <a:off x="186612" y="1825625"/>
+            <a:ext cx="3359021" cy="4351338"/>
+          </a:xfrm>
+        </p:spPr>
+        <p:txBody>
+          <a:bodyPr>
+            <a:normAutofit lnSpcReduction="10000"/>
+          </a:bodyPr>
+          <a:lstStyle/>
+          <a:p>
+            <a:r>
+              <a:rPr lang="en-US" dirty="0"/>
+              <a:t>Click through the welcome screens for now </a:t>
+            </a:r>
+          </a:p>
+          <a:p>
+            <a:pPr lvl="1"/>
+            <a:r>
+              <a:rPr lang="en-US" dirty="0"/>
+              <a:t>You can set up and personalize </a:t>
+            </a:r>
+            <a:r>
+              <a:rPr lang="en-US" dirty="0" err="1"/>
+              <a:t>VSCode</a:t>
+            </a:r>
+            <a:r>
+              <a:rPr lang="en-US" dirty="0"/>
+              <a:t> later (there are plenty of sources for this online)</a:t>
+            </a:r>
+          </a:p>
+          <a:p>
+            <a:pPr lvl="1"/>
+            <a:endParaRPr lang="en-US" dirty="0"/>
+          </a:p>
+          <a:p>
+            <a:r>
+              <a:rPr lang="en-US" dirty="0"/>
+              <a:t>We will go over the basics of </a:t>
+            </a:r>
+            <a:r>
+              <a:rPr lang="en-US" dirty="0" err="1"/>
+              <a:t>VSCode</a:t>
+            </a:r>
+            <a:r>
+              <a:rPr lang="en-US" dirty="0"/>
+              <a:t> in the next Chapter</a:t>
+            </a:r>
+          </a:p>
+        </p:txBody>
+      </p:sp>
+      <p:pic>
+        <p:nvPicPr>
+          <p:cNvPr id="4" name="Picture 3">
+            <a:extLst>
+              <a:ext uri="{FF2B5EF4-FFF2-40B4-BE49-F238E27FC236}">
+                <a16:creationId xmlns:a16="http://schemas.microsoft.com/office/drawing/2014/main" id="{1B7AF3B3-D6B8-BDF8-76BC-3F8D52AA59C8}"/>
+              </a:ext>
+            </a:extLst>
+          </p:cNvPr>
+          <p:cNvPicPr>
+            <a:picLocks noChangeAspect="1"/>
+          </p:cNvPicPr>
+          <p:nvPr/>
+        </p:nvPicPr>
+        <p:blipFill>
+          <a:blip r:embed="rId2"/>
+          <a:stretch>
+            <a:fillRect/>
+          </a:stretch>
+        </p:blipFill>
+        <p:spPr>
+          <a:xfrm>
+            <a:off x="3655526" y="1978090"/>
+            <a:ext cx="8443167" cy="4749282"/>
+          </a:xfrm>
+          <a:prstGeom prst="rect">
+            <a:avLst/>
+          </a:prstGeom>
+        </p:spPr>
+      </p:pic>
+    </p:spTree>
+    <p:extLst>
+      <p:ext uri="{BB962C8B-B14F-4D97-AF65-F5344CB8AC3E}">
+        <p14:creationId xmlns:p14="http://schemas.microsoft.com/office/powerpoint/2010/main" val="1858666320"/>
+      </p:ext>
+    </p:extLst>
+  </p:cSld>
+  <p:clrMapOvr>
+    <a:masterClrMapping/>
+  </p:clrMapOvr>
+</p:sld>
+</file>
+
+<file path=ppt/slides/slide11.xml><?xml version="1.0" encoding="utf-8"?>
+<p:sld xmlns:a="http://schemas.openxmlformats.org/drawingml/2006/main" xmlns:r="http://schemas.openxmlformats.org/officeDocument/2006/relationships" xmlns:p="http://schemas.openxmlformats.org/presentationml/2006/main">
+  <p:cSld>
+    <p:spTree>
+      <p:nvGrpSpPr>
+        <p:cNvPr id="1" name=""/>
+        <p:cNvGrpSpPr/>
+        <p:nvPr/>
+      </p:nvGrpSpPr>
+      <p:grpSpPr>
+        <a:xfrm>
+          <a:off x="0" y="0"/>
+          <a:ext cx="0" cy="0"/>
+          <a:chOff x="0" y="0"/>
+          <a:chExt cx="0" cy="0"/>
+        </a:xfrm>
+      </p:grpSpPr>
+      <p:sp>
+        <p:nvSpPr>
+          <p:cNvPr id="2" name="Title 1">
+            <a:extLst>
+              <a:ext uri="{FF2B5EF4-FFF2-40B4-BE49-F238E27FC236}">
+                <a16:creationId xmlns:a16="http://schemas.microsoft.com/office/drawing/2014/main" id="{20F74278-B7CD-F4AA-E724-81A5E24EC3C8}"/>
+              </a:ext>
+            </a:extLst>
+          </p:cNvPr>
+          <p:cNvSpPr>
+            <a:spLocks noGrp="1"/>
+          </p:cNvSpPr>
+          <p:nvPr>
+            <p:ph type="title"/>
+          </p:nvPr>
+        </p:nvSpPr>
+        <p:spPr/>
+        <p:txBody>
+          <a:bodyPr/>
+          <a:lstStyle/>
+          <a:p>
+            <a:r>
+              <a:rPr lang="en-US" dirty="0"/>
+              <a:t>Opening The Workshop in </a:t>
+            </a:r>
+            <a:r>
+              <a:rPr lang="en-US"/>
+              <a:t>VSCode </a:t>
+            </a:r>
+            <a:endParaRPr lang="en-US" dirty="0"/>
+          </a:p>
+        </p:txBody>
+      </p:sp>
+      <p:sp>
+        <p:nvSpPr>
+          <p:cNvPr id="3" name="Content Placeholder 2">
+            <a:extLst>
+              <a:ext uri="{FF2B5EF4-FFF2-40B4-BE49-F238E27FC236}">
+                <a16:creationId xmlns:a16="http://schemas.microsoft.com/office/drawing/2014/main" id="{53F759D9-A6C2-F4FA-FCAF-D79914FAD71B}"/>
+              </a:ext>
+            </a:extLst>
+          </p:cNvPr>
+          <p:cNvSpPr>
+            <a:spLocks noGrp="1"/>
+          </p:cNvSpPr>
+          <p:nvPr>
+            <p:ph idx="1"/>
+          </p:nvPr>
+        </p:nvSpPr>
+        <p:spPr/>
+        <p:txBody>
+          <a:bodyPr/>
+          <a:lstStyle/>
+          <a:p>
+            <a:endParaRPr lang="en-US"/>
+          </a:p>
+        </p:txBody>
+      </p:sp>
+    </p:spTree>
+    <p:extLst>
+      <p:ext uri="{BB962C8B-B14F-4D97-AF65-F5344CB8AC3E}">
+        <p14:creationId xmlns:p14="http://schemas.microsoft.com/office/powerpoint/2010/main" val="642325499"/>
+      </p:ext>
+    </p:extLst>
+  </p:cSld>
+  <p:clrMapOvr>
+    <a:masterClrMapping/>
+  </p:clrMapOvr>
+</p:sld>
+</file>
+
+<file path=ppt/slides/slide12.xml><?xml version="1.0" encoding="utf-8"?>
+<p:sld xmlns:a="http://schemas.openxmlformats.org/drawingml/2006/main" xmlns:r="http://schemas.openxmlformats.org/officeDocument/2006/relationships" xmlns:p="http://schemas.openxmlformats.org/presentationml/2006/main">
+  <p:cSld>
+    <p:spTree>
+      <p:nvGrpSpPr>
+        <p:cNvPr id="1" name=""/>
+        <p:cNvGrpSpPr/>
+        <p:nvPr/>
+      </p:nvGrpSpPr>
+      <p:grpSpPr>
+        <a:xfrm>
+          <a:off x="0" y="0"/>
+          <a:ext cx="0" cy="0"/>
+          <a:chOff x="0" y="0"/>
+          <a:chExt cx="0" cy="0"/>
+        </a:xfrm>
+      </p:grpSpPr>
+      <p:sp>
+        <p:nvSpPr>
+          <p:cNvPr id="2" name="Title 1">
+            <a:extLst>
+              <a:ext uri="{FF2B5EF4-FFF2-40B4-BE49-F238E27FC236}">
+                <a16:creationId xmlns:a16="http://schemas.microsoft.com/office/drawing/2014/main" id="{8933B02C-2427-2168-EDB0-D56B81266C21}"/>
+              </a:ext>
+            </a:extLst>
+          </p:cNvPr>
+          <p:cNvSpPr>
+            <a:spLocks noGrp="1"/>
+          </p:cNvSpPr>
+          <p:nvPr>
+            <p:ph type="title"/>
+          </p:nvPr>
+        </p:nvSpPr>
+        <p:spPr/>
+        <p:txBody>
+          <a:bodyPr/>
+          <a:lstStyle/>
+          <a:p>
+            <a:endParaRPr lang="en-US"/>
+          </a:p>
+        </p:txBody>
+      </p:sp>
+      <p:sp>
+        <p:nvSpPr>
+          <p:cNvPr id="3" name="Content Placeholder 2">
+            <a:extLst>
+              <a:ext uri="{FF2B5EF4-FFF2-40B4-BE49-F238E27FC236}">
+                <a16:creationId xmlns:a16="http://schemas.microsoft.com/office/drawing/2014/main" id="{B44C5CB4-A309-DAFB-B6D1-A21E1EB129FB}"/>
+              </a:ext>
+            </a:extLst>
+          </p:cNvPr>
+          <p:cNvSpPr>
+            <a:spLocks noGrp="1"/>
+          </p:cNvSpPr>
+          <p:nvPr>
+            <p:ph idx="1"/>
+          </p:nvPr>
+        </p:nvSpPr>
+        <p:spPr/>
+        <p:txBody>
+          <a:bodyPr/>
+          <a:lstStyle/>
+          <a:p>
+            <a:r>
+              <a:rPr lang="en-US" dirty="0"/>
+              <a:t>Congratulations! You have finished Chapter 1. We will now learn a little bit about how to use </a:t>
+            </a:r>
+            <a:r>
+              <a:rPr lang="en-US" dirty="0" err="1"/>
+              <a:t>VSCode</a:t>
+            </a:r>
+            <a:r>
+              <a:rPr lang="en-US" dirty="0"/>
+              <a:t> and download some packages that are useful for writing Python</a:t>
+            </a:r>
+          </a:p>
+          <a:p>
+            <a:endParaRPr lang="en-US" dirty="0"/>
+          </a:p>
+        </p:txBody>
+      </p:sp>
+    </p:spTree>
+    <p:extLst>
+      <p:ext uri="{BB962C8B-B14F-4D97-AF65-F5344CB8AC3E}">
+        <p14:creationId xmlns:p14="http://schemas.microsoft.com/office/powerpoint/2010/main" val="376891146"/>
+      </p:ext>
+    </p:extLst>
+  </p:cSld>
+  <p:clrMapOvr>
+    <a:masterClrMapping/>
+  </p:clrMapOvr>
+</p:sld>
+</file>
+
 <file path=ppt/slides/slide2.xml><?xml version="1.0" encoding="utf-8"?>
 <p:sld xmlns:a="http://schemas.openxmlformats.org/drawingml/2006/main" xmlns:r="http://schemas.openxmlformats.org/officeDocument/2006/relationships" xmlns:p="http://schemas.openxmlformats.org/presentationml/2006/main">
   <p:cSld>
@@ -4580,6 +4931,94 @@
           </a:prstGeom>
         </p:spPr>
       </p:pic>
+      <p:cxnSp>
+        <p:nvCxnSpPr>
+          <p:cNvPr id="4" name="Straight Arrow Connector 3">
+            <a:extLst>
+              <a:ext uri="{FF2B5EF4-FFF2-40B4-BE49-F238E27FC236}">
+                <a16:creationId xmlns:a16="http://schemas.microsoft.com/office/drawing/2014/main" id="{32EDC174-8DC7-153B-9FA0-7ED7F38318DB}"/>
+              </a:ext>
+            </a:extLst>
+          </p:cNvPr>
+          <p:cNvCxnSpPr>
+            <a:cxnSpLocks/>
+          </p:cNvCxnSpPr>
+          <p:nvPr/>
+        </p:nvCxnSpPr>
+        <p:spPr>
+          <a:xfrm>
+            <a:off x="3165894" y="3303917"/>
+            <a:ext cx="3795623" cy="543464"/>
+          </a:xfrm>
+          <a:prstGeom prst="straightConnector1">
+            <a:avLst/>
+          </a:prstGeom>
+          <a:ln w="28575">
+            <a:solidFill>
+              <a:srgbClr val="FF0000"/>
+            </a:solidFill>
+            <a:tailEnd type="triangle"/>
+          </a:ln>
+        </p:spPr>
+        <p:style>
+          <a:lnRef idx="1">
+            <a:schemeClr val="accent1"/>
+          </a:lnRef>
+          <a:fillRef idx="0">
+            <a:schemeClr val="accent1"/>
+          </a:fillRef>
+          <a:effectRef idx="0">
+            <a:schemeClr val="accent1"/>
+          </a:effectRef>
+          <a:fontRef idx="minor">
+            <a:schemeClr val="tx1"/>
+          </a:fontRef>
+        </p:style>
+      </p:cxnSp>
+      <p:cxnSp>
+        <p:nvCxnSpPr>
+          <p:cNvPr id="8" name="Straight Arrow Connector 7">
+            <a:extLst>
+              <a:ext uri="{FF2B5EF4-FFF2-40B4-BE49-F238E27FC236}">
+                <a16:creationId xmlns:a16="http://schemas.microsoft.com/office/drawing/2014/main" id="{35BBCB53-A163-D508-4934-D3D0C4FAA9ED}"/>
+              </a:ext>
+            </a:extLst>
+          </p:cNvPr>
+          <p:cNvCxnSpPr>
+            <a:cxnSpLocks/>
+          </p:cNvCxnSpPr>
+          <p:nvPr/>
+        </p:nvCxnSpPr>
+        <p:spPr>
+          <a:xfrm>
+            <a:off x="2602302" y="4655389"/>
+            <a:ext cx="7680385" cy="805221"/>
+          </a:xfrm>
+          <a:prstGeom prst="straightConnector1">
+            <a:avLst/>
+          </a:prstGeom>
+          <a:ln w="28575">
+            <a:solidFill>
+              <a:srgbClr val="FF0000"/>
+            </a:solidFill>
+            <a:tailEnd type="triangle"/>
+          </a:ln>
+        </p:spPr>
+        <p:style>
+          <a:lnRef idx="1">
+            <a:schemeClr val="accent1"/>
+          </a:lnRef>
+          <a:fillRef idx="0">
+            <a:schemeClr val="accent1"/>
+          </a:fillRef>
+          <a:effectRef idx="0">
+            <a:schemeClr val="accent1"/>
+          </a:effectRef>
+          <a:fontRef idx="minor">
+            <a:schemeClr val="tx1"/>
+          </a:fontRef>
+        </p:style>
+      </p:cxnSp>
     </p:spTree>
     <p:extLst>
       <p:ext uri="{BB962C8B-B14F-4D97-AF65-F5344CB8AC3E}">
@@ -4679,15 +5118,7 @@
           <a:p>
             <a:r>
               <a:rPr lang="en-US" dirty="0"/>
-              <a:t>Congratulations! You have finished Chapter 1. We will now learn a little bit about how to use </a:t>
-            </a:r>
-            <a:r>
-              <a:rPr lang="en-US" dirty="0" err="1"/>
-              <a:t>VSCode</a:t>
-            </a:r>
-            <a:r>
-              <a:rPr lang="en-US" dirty="0"/>
-              <a:t> and download some packages that are useful for writing Python</a:t>
+              <a:t>Once back, proceed to the next slide</a:t>
             </a:r>
           </a:p>
         </p:txBody>

</xml_diff>

<commit_message>
changes to ch1 pptx prior to making git pull slide
</commit_message>
<xml_diff>
--- a/1 Getting Started/Chapter 1.pptx
+++ b/1 Getting Started/Chapter 1.pptx
@@ -3813,7 +3813,7 @@
         <p:spPr/>
         <p:txBody>
           <a:bodyPr>
-            <a:normAutofit fontScale="92500" lnSpcReduction="10000"/>
+            <a:normAutofit fontScale="92500" lnSpcReduction="20000"/>
           </a:bodyPr>
           <a:lstStyle/>
           <a:p>
@@ -3828,7 +3828,7 @@
           <a:p>
             <a:r>
               <a:rPr lang="en-US" dirty="0"/>
-              <a:t>All content for this workshop can be found here: </a:t>
+              <a:t>All content for this workshop can be found here (we will download at the end of this chapter): </a:t>
             </a:r>
             <a:r>
               <a:rPr lang="en-US" dirty="0" err="1">

</xml_diff>

<commit_message>
updated ch1 slides with all but opening workshop
</commit_message>
<xml_diff>
--- a/1 Getting Started/Chapter 1.pptx
+++ b/1 Getting Started/Chapter 1.pptx
@@ -3638,7 +3638,10 @@
           <a:bodyPr/>
           <a:lstStyle/>
           <a:p>
-            <a:endParaRPr lang="en-US"/>
+            <a:r>
+              <a:rPr lang="en-US" dirty="0"/>
+              <a:t>Click on the link to the workshop GitHub page (on slide 2)</a:t>
+            </a:r>
           </a:p>
         </p:txBody>
       </p:sp>
@@ -3693,7 +3696,10 @@
           <a:bodyPr/>
           <a:lstStyle/>
           <a:p>
-            <a:endParaRPr lang="en-US"/>
+            <a:r>
+              <a:rPr lang="en-US" dirty="0"/>
+              <a:t>End of Chapter 1</a:t>
+            </a:r>
           </a:p>
         </p:txBody>
       </p:sp>
@@ -3865,7 +3871,7 @@
           <a:p>
             <a:r>
               <a:rPr lang="en-US" dirty="0"/>
-              <a:t>All instructions will be conveyed in the form of PowerPoints up through the first part of Chapter 2. After that, markdown (.md) files will be used to allow you to become more familiar with working in a text editor</a:t>
+              <a:t>All instructions will be conveyed in the form of PowerPoints for this chapter. After that, markdown (.md) files will be used to allow you to become more familiar with working in a text editor</a:t>
             </a:r>
           </a:p>
           <a:p>
@@ -3874,7 +3880,7 @@
           <a:p>
             <a:r>
               <a:rPr lang="en-US" dirty="0"/>
-              <a:t>If you have any questions, please let me know</a:t>
+              <a:t>If you have questions at any point, please let me know</a:t>
             </a:r>
           </a:p>
           <a:p>

</xml_diff>